<commit_message>
Aggiornata slide con Tabella Dati a 2 variabili
</commit_message>
<xml_diff>
--- a/ppt/Corso_Excel_Base_Avanzato_Parte6.pptx
+++ b/ppt/Corso_Excel_Base_Avanzato_Parte6.pptx
@@ -293,7 +293,7 @@
               <a:pPr>
                 <a:defRPr/>
               </a:pPr>
-              <a:t>11-Jul-23</a:t>
+              <a:t>12-Jul-23</a:t>
             </a:fld>
             <a:endParaRPr lang="en-US" dirty="0"/>
           </a:p>
@@ -2607,7 +2607,7 @@
               <a:pPr>
                 <a:defRPr/>
               </a:pPr>
-              <a:t>11-Jul-23</a:t>
+              <a:t>12-Jul-23</a:t>
             </a:fld>
             <a:endParaRPr lang="en-US" dirty="0"/>
           </a:p>
@@ -3766,7 +3766,7 @@
               <a:pPr>
                 <a:defRPr/>
               </a:pPr>
-              <a:t>11-Jul-23</a:t>
+              <a:t>12-Jul-23</a:t>
             </a:fld>
             <a:endParaRPr lang="en-US" dirty="0"/>
           </a:p>
@@ -5110,7 +5110,7 @@
               <a:pPr>
                 <a:defRPr/>
               </a:pPr>
-              <a:t>11-Jul-23</a:t>
+              <a:t>12-Jul-23</a:t>
             </a:fld>
             <a:endParaRPr lang="en-US" dirty="0"/>
           </a:p>
@@ -6734,7 +6734,7 @@
               <a:pPr>
                 <a:defRPr/>
               </a:pPr>
-              <a:t>11-Jul-23</a:t>
+              <a:t>12-Jul-23</a:t>
             </a:fld>
             <a:endParaRPr lang="en-US" dirty="0"/>
           </a:p>
@@ -7462,7 +7462,7 @@
               <a:pPr>
                 <a:defRPr/>
               </a:pPr>
-              <a:t>11-Jul-23</a:t>
+              <a:t>12-Jul-23</a:t>
             </a:fld>
             <a:endParaRPr lang="en-US" dirty="0"/>
           </a:p>
@@ -8714,7 +8714,7 @@
               <a:pPr>
                 <a:defRPr/>
               </a:pPr>
-              <a:t>11-Jul-23</a:t>
+              <a:t>12-Jul-23</a:t>
             </a:fld>
             <a:endParaRPr lang="en-US" dirty="0"/>
           </a:p>
@@ -9301,7 +9301,7 @@
               <a:pPr>
                 <a:defRPr/>
               </a:pPr>
-              <a:t>11-Jul-23</a:t>
+              <a:t>12-Jul-23</a:t>
             </a:fld>
             <a:endParaRPr lang="en-US" dirty="0"/>
           </a:p>
@@ -9746,7 +9746,7 @@
               <a:pPr>
                 <a:defRPr/>
               </a:pPr>
-              <a:t>11-Jul-23</a:t>
+              <a:t>12-Jul-23</a:t>
             </a:fld>
             <a:endParaRPr lang="en-US" dirty="0"/>
           </a:p>
@@ -11401,7 +11401,7 @@
               <a:pPr>
                 <a:defRPr/>
               </a:pPr>
-              <a:t>11-Jul-23</a:t>
+              <a:t>12-Jul-23</a:t>
             </a:fld>
             <a:endParaRPr lang="en-US" dirty="0"/>
           </a:p>
@@ -12669,7 +12669,7 @@
               <a:pPr>
                 <a:defRPr/>
               </a:pPr>
-              <a:t>11-Jul-23</a:t>
+              <a:t>12-Jul-23</a:t>
             </a:fld>
             <a:endParaRPr lang="en-US" dirty="0"/>
           </a:p>
@@ -13007,7 +13007,7 @@
               <a:pPr>
                 <a:defRPr/>
               </a:pPr>
-              <a:t>11-Jul-23</a:t>
+              <a:t>12-Jul-23</a:t>
             </a:fld>
             <a:endParaRPr lang="en-US" dirty="0"/>
           </a:p>
@@ -15332,7 +15332,7 @@
             <a:fld id="{7E7AB22C-8B7E-9B4A-8C65-396C3C874D86}" type="datetime1">
               <a:rPr lang="en-US" smtClean="0"/>
               <a:pPr/>
-              <a:t>11-Jul-23</a:t>
+              <a:t>12-Jul-23</a:t>
             </a:fld>
             <a:endParaRPr lang="en-US" dirty="0"/>
           </a:p>
@@ -17295,7 +17295,7 @@
             <a:fld id="{7E7AB22C-8B7E-9B4A-8C65-396C3C874D86}" type="datetime1">
               <a:rPr lang="en-US" smtClean="0"/>
               <a:pPr/>
-              <a:t>11-Jul-23</a:t>
+              <a:t>12-Jul-23</a:t>
             </a:fld>
             <a:endParaRPr lang="en-US" dirty="0"/>
           </a:p>
@@ -18859,7 +18859,7 @@
             <a:fld id="{7E7AB22C-8B7E-9B4A-8C65-396C3C874D86}" type="datetime1">
               <a:rPr lang="en-US" smtClean="0"/>
               <a:pPr/>
-              <a:t>11-Jul-23</a:t>
+              <a:t>12-Jul-23</a:t>
             </a:fld>
             <a:endParaRPr lang="en-US" dirty="0"/>
           </a:p>
@@ -20853,7 +20853,7 @@
             <a:fld id="{7E7AB22C-8B7E-9B4A-8C65-396C3C874D86}" type="datetime1">
               <a:rPr lang="en-US" smtClean="0"/>
               <a:pPr/>
-              <a:t>11-Jul-23</a:t>
+              <a:t>12-Jul-23</a:t>
             </a:fld>
             <a:endParaRPr lang="en-US" dirty="0"/>
           </a:p>
@@ -21855,7 +21855,7 @@
             <a:fld id="{7E7AB22C-8B7E-9B4A-8C65-396C3C874D86}" type="datetime1">
               <a:rPr lang="en-US" smtClean="0"/>
               <a:pPr/>
-              <a:t>11-Jul-23</a:t>
+              <a:t>12-Jul-23</a:t>
             </a:fld>
             <a:endParaRPr lang="en-US" dirty="0"/>
           </a:p>
@@ -23729,7 +23729,7 @@
             <a:fld id="{7E7AB22C-8B7E-9B4A-8C65-396C3C874D86}" type="datetime1">
               <a:rPr lang="en-US" smtClean="0"/>
               <a:pPr/>
-              <a:t>11-Jul-23</a:t>
+              <a:t>12-Jul-23</a:t>
             </a:fld>
             <a:endParaRPr lang="en-US" dirty="0"/>
           </a:p>
@@ -30577,7 +30577,7 @@
           <a:p>
             <a:pPr eaLnBrk="1" hangingPunct="1"/>
             <a:r>
-              <a:rPr lang="en-US" altLang="en-US" sz="2200" b="1">
+              <a:rPr lang="en-US" altLang="en-US" sz="2200" b="1" dirty="0">
                 <a:solidFill>
                   <a:srgbClr val="141414"/>
                 </a:solidFill>
@@ -30665,7 +30665,7 @@
         </p:nvSpPr>
         <p:spPr bwMode="auto">
           <a:xfrm>
-            <a:off x="2641600" y="5524500"/>
+            <a:off x="2641600" y="5694669"/>
             <a:ext cx="6908800" cy="769938"/>
           </a:xfrm>
           <a:prstGeom prst="rect">
@@ -30978,6 +30978,466 @@
                 <a:cs typeface="Arial" panose="020B0604020202020204" pitchFamily="34" charset="0"/>
               </a:rPr>
               <a:t>variabili</a:t>
+            </a:r>
+            <a:endParaRPr lang="en-US" altLang="en-US" sz="2200" b="1" dirty="0">
+              <a:solidFill>
+                <a:srgbClr val="141414"/>
+              </a:solidFill>
+              <a:latin typeface="Tenorite (Body)"/>
+              <a:cs typeface="Arial" panose="020B0604020202020204" pitchFamily="34" charset="0"/>
+            </a:endParaRPr>
+          </a:p>
+        </p:txBody>
+      </p:sp>
+      <p:sp>
+        <p:nvSpPr>
+          <p:cNvPr id="2" name="TextBox 10">
+            <a:extLst>
+              <a:ext uri="{FF2B5EF4-FFF2-40B4-BE49-F238E27FC236}">
+                <a16:creationId xmlns:a16="http://schemas.microsoft.com/office/drawing/2014/main" id="{B8EF6F02-B616-177D-73B0-04383DD8E9F3}"/>
+              </a:ext>
+            </a:extLst>
+          </p:cNvPr>
+          <p:cNvSpPr txBox="1">
+            <a:spLocks noChangeArrowheads="1"/>
+          </p:cNvSpPr>
+          <p:nvPr/>
+        </p:nvSpPr>
+        <p:spPr bwMode="auto">
+          <a:xfrm>
+            <a:off x="4445796" y="4152683"/>
+            <a:ext cx="6907212" cy="1446550"/>
+          </a:xfrm>
+          <a:prstGeom prst="rect">
+            <a:avLst/>
+          </a:prstGeom>
+          <a:noFill/>
+          <a:ln>
+            <a:noFill/>
+          </a:ln>
+          <a:extLst>
+            <a:ext uri="{909E8E84-426E-40DD-AFC4-6F175D3DCCD1}">
+              <a14:hiddenFill xmlns:a14="http://schemas.microsoft.com/office/drawing/2010/main">
+                <a:solidFill>
+                  <a:srgbClr val="FFFFFF"/>
+                </a:solidFill>
+              </a14:hiddenFill>
+            </a:ext>
+            <a:ext uri="{91240B29-F687-4F45-9708-019B960494DF}">
+              <a14:hiddenLine xmlns:a14="http://schemas.microsoft.com/office/drawing/2010/main" w="9525">
+                <a:solidFill>
+                  <a:srgbClr val="000000"/>
+                </a:solidFill>
+                <a:miter lim="800000"/>
+                <a:headEnd/>
+                <a:tailEnd/>
+              </a14:hiddenLine>
+            </a:ext>
+          </a:extLst>
+        </p:spPr>
+        <p:txBody>
+          <a:bodyPr>
+            <a:spAutoFit/>
+          </a:bodyPr>
+          <a:lstStyle>
+            <a:lvl1pPr>
+              <a:defRPr>
+                <a:solidFill>
+                  <a:schemeClr val="tx1"/>
+                </a:solidFill>
+                <a:latin typeface="Tenorite" panose="00000500000000000000" pitchFamily="2" charset="0"/>
+              </a:defRPr>
+            </a:lvl1pPr>
+            <a:lvl2pPr marL="742950" indent="-285750">
+              <a:defRPr>
+                <a:solidFill>
+                  <a:schemeClr val="tx1"/>
+                </a:solidFill>
+                <a:latin typeface="Tenorite" panose="00000500000000000000" pitchFamily="2" charset="0"/>
+              </a:defRPr>
+            </a:lvl2pPr>
+            <a:lvl3pPr marL="1143000" indent="-228600">
+              <a:defRPr>
+                <a:solidFill>
+                  <a:schemeClr val="tx1"/>
+                </a:solidFill>
+                <a:latin typeface="Tenorite" panose="00000500000000000000" pitchFamily="2" charset="0"/>
+              </a:defRPr>
+            </a:lvl3pPr>
+            <a:lvl4pPr marL="1600200" indent="-228600">
+              <a:defRPr>
+                <a:solidFill>
+                  <a:schemeClr val="tx1"/>
+                </a:solidFill>
+                <a:latin typeface="Tenorite" panose="00000500000000000000" pitchFamily="2" charset="0"/>
+              </a:defRPr>
+            </a:lvl4pPr>
+            <a:lvl5pPr marL="2057400" indent="-228600">
+              <a:defRPr>
+                <a:solidFill>
+                  <a:schemeClr val="tx1"/>
+                </a:solidFill>
+                <a:latin typeface="Tenorite" panose="00000500000000000000" pitchFamily="2" charset="0"/>
+              </a:defRPr>
+            </a:lvl5pPr>
+            <a:lvl6pPr marL="2514600" indent="-228600" fontAlgn="base">
+              <a:spcBef>
+                <a:spcPct val="0"/>
+              </a:spcBef>
+              <a:spcAft>
+                <a:spcPct val="0"/>
+              </a:spcAft>
+              <a:defRPr>
+                <a:solidFill>
+                  <a:schemeClr val="tx1"/>
+                </a:solidFill>
+                <a:latin typeface="Tenorite" panose="00000500000000000000" pitchFamily="2" charset="0"/>
+              </a:defRPr>
+            </a:lvl6pPr>
+            <a:lvl7pPr marL="2971800" indent="-228600" fontAlgn="base">
+              <a:spcBef>
+                <a:spcPct val="0"/>
+              </a:spcBef>
+              <a:spcAft>
+                <a:spcPct val="0"/>
+              </a:spcAft>
+              <a:defRPr>
+                <a:solidFill>
+                  <a:schemeClr val="tx1"/>
+                </a:solidFill>
+                <a:latin typeface="Tenorite" panose="00000500000000000000" pitchFamily="2" charset="0"/>
+              </a:defRPr>
+            </a:lvl7pPr>
+            <a:lvl8pPr marL="3429000" indent="-228600" fontAlgn="base">
+              <a:spcBef>
+                <a:spcPct val="0"/>
+              </a:spcBef>
+              <a:spcAft>
+                <a:spcPct val="0"/>
+              </a:spcAft>
+              <a:defRPr>
+                <a:solidFill>
+                  <a:schemeClr val="tx1"/>
+                </a:solidFill>
+                <a:latin typeface="Tenorite" panose="00000500000000000000" pitchFamily="2" charset="0"/>
+              </a:defRPr>
+            </a:lvl8pPr>
+            <a:lvl9pPr marL="3886200" indent="-228600" fontAlgn="base">
+              <a:spcBef>
+                <a:spcPct val="0"/>
+              </a:spcBef>
+              <a:spcAft>
+                <a:spcPct val="0"/>
+              </a:spcAft>
+              <a:defRPr>
+                <a:solidFill>
+                  <a:schemeClr val="tx1"/>
+                </a:solidFill>
+                <a:latin typeface="Tenorite" panose="00000500000000000000" pitchFamily="2" charset="0"/>
+              </a:defRPr>
+            </a:lvl9pPr>
+          </a:lstStyle>
+          <a:p>
+            <a:pPr eaLnBrk="1" hangingPunct="1"/>
+            <a:r>
+              <a:rPr lang="en-US" altLang="en-US" sz="2200" dirty="0" err="1">
+                <a:solidFill>
+                  <a:srgbClr val="141414"/>
+                </a:solidFill>
+                <a:latin typeface="Tenorite (Body)"/>
+                <a:cs typeface="Arial" panose="020B0604020202020204" pitchFamily="34" charset="0"/>
+              </a:rPr>
+              <a:t>Selezionando</a:t>
+            </a:r>
+            <a:r>
+              <a:rPr lang="en-US" altLang="en-US" sz="2200" dirty="0">
+                <a:solidFill>
+                  <a:srgbClr val="141414"/>
+                </a:solidFill>
+                <a:latin typeface="Tenorite (Body)"/>
+                <a:cs typeface="Arial" panose="020B0604020202020204" pitchFamily="34" charset="0"/>
+              </a:rPr>
+              <a:t> </a:t>
+            </a:r>
+            <a:r>
+              <a:rPr lang="en-US" altLang="en-US" sz="2200" dirty="0" err="1">
+                <a:solidFill>
+                  <a:srgbClr val="141414"/>
+                </a:solidFill>
+                <a:latin typeface="Tenorite (Body)"/>
+                <a:cs typeface="Arial" panose="020B0604020202020204" pitchFamily="34" charset="0"/>
+              </a:rPr>
+              <a:t>l’intero</a:t>
+            </a:r>
+            <a:r>
+              <a:rPr lang="en-US" altLang="en-US" sz="2200" dirty="0">
+                <a:solidFill>
+                  <a:srgbClr val="141414"/>
+                </a:solidFill>
+                <a:latin typeface="Tenorite (Body)"/>
+                <a:cs typeface="Arial" panose="020B0604020202020204" pitchFamily="34" charset="0"/>
+              </a:rPr>
+              <a:t> range e poi </a:t>
+            </a:r>
+            <a:r>
+              <a:rPr lang="en-US" altLang="en-US" sz="2200" dirty="0" err="1">
+                <a:solidFill>
+                  <a:srgbClr val="141414"/>
+                </a:solidFill>
+                <a:latin typeface="Tenorite (Body)"/>
+                <a:cs typeface="Arial" panose="020B0604020202020204" pitchFamily="34" charset="0"/>
+              </a:rPr>
+              <a:t>andando</a:t>
+            </a:r>
+            <a:r>
+              <a:rPr lang="en-US" altLang="en-US" sz="2200" dirty="0">
+                <a:solidFill>
+                  <a:srgbClr val="141414"/>
+                </a:solidFill>
+                <a:latin typeface="Tenorite (Body)"/>
+                <a:cs typeface="Arial" panose="020B0604020202020204" pitchFamily="34" charset="0"/>
+              </a:rPr>
+              <a:t> </a:t>
+            </a:r>
+            <a:r>
+              <a:rPr lang="en-US" altLang="en-US" sz="2200" dirty="0" err="1">
+                <a:solidFill>
+                  <a:srgbClr val="141414"/>
+                </a:solidFill>
+                <a:latin typeface="Tenorite (Body)"/>
+                <a:cs typeface="Arial" panose="020B0604020202020204" pitchFamily="34" charset="0"/>
+              </a:rPr>
+              <a:t>nel</a:t>
+            </a:r>
+            <a:r>
+              <a:rPr lang="en-US" altLang="en-US" sz="2200" dirty="0">
+                <a:solidFill>
+                  <a:srgbClr val="141414"/>
+                </a:solidFill>
+                <a:latin typeface="Tenorite (Body)"/>
+                <a:cs typeface="Arial" panose="020B0604020202020204" pitchFamily="34" charset="0"/>
+              </a:rPr>
+              <a:t> menu </a:t>
+            </a:r>
+            <a:r>
+              <a:rPr lang="en-US" altLang="en-US" sz="2200" b="1" dirty="0">
+                <a:solidFill>
+                  <a:srgbClr val="141414"/>
+                </a:solidFill>
+                <a:latin typeface="Tenorite (Body)"/>
+                <a:cs typeface="Arial" panose="020B0604020202020204" pitchFamily="34" charset="0"/>
+              </a:rPr>
+              <a:t>Data&gt;</a:t>
+            </a:r>
+            <a:r>
+              <a:rPr lang="en-US" altLang="en-US" sz="2200" b="1" dirty="0" err="1">
+                <a:solidFill>
+                  <a:srgbClr val="141414"/>
+                </a:solidFill>
+                <a:latin typeface="Tenorite (Body)"/>
+                <a:cs typeface="Arial" panose="020B0604020202020204" pitchFamily="34" charset="0"/>
+              </a:rPr>
+              <a:t>WhatIfAnalysis</a:t>
+            </a:r>
+            <a:r>
+              <a:rPr lang="en-US" altLang="en-US" sz="2200" b="1" dirty="0">
+                <a:solidFill>
+                  <a:srgbClr val="141414"/>
+                </a:solidFill>
+                <a:latin typeface="Tenorite (Body)"/>
+                <a:cs typeface="Arial" panose="020B0604020202020204" pitchFamily="34" charset="0"/>
+              </a:rPr>
+              <a:t>&gt;Data Table</a:t>
+            </a:r>
+            <a:r>
+              <a:rPr lang="en-US" altLang="en-US" sz="2200" dirty="0">
+                <a:solidFill>
+                  <a:srgbClr val="141414"/>
+                </a:solidFill>
+                <a:latin typeface="Tenorite (Body)"/>
+                <a:cs typeface="Arial" panose="020B0604020202020204" pitchFamily="34" charset="0"/>
+              </a:rPr>
+              <a:t>, </a:t>
+            </a:r>
+            <a:r>
+              <a:rPr lang="en-US" altLang="en-US" sz="2200" dirty="0" err="1">
+                <a:solidFill>
+                  <a:srgbClr val="141414"/>
+                </a:solidFill>
+                <a:latin typeface="Tenorite (Body)"/>
+                <a:cs typeface="Arial" panose="020B0604020202020204" pitchFamily="34" charset="0"/>
+              </a:rPr>
+              <a:t>si</a:t>
+            </a:r>
+            <a:r>
+              <a:rPr lang="en-US" altLang="en-US" sz="2200" dirty="0">
+                <a:solidFill>
+                  <a:srgbClr val="141414"/>
+                </a:solidFill>
+                <a:latin typeface="Tenorite (Body)"/>
+                <a:cs typeface="Arial" panose="020B0604020202020204" pitchFamily="34" charset="0"/>
+              </a:rPr>
+              <a:t> </a:t>
+            </a:r>
+            <a:r>
+              <a:rPr lang="en-US" altLang="en-US" sz="2200" dirty="0" err="1">
+                <a:solidFill>
+                  <a:srgbClr val="141414"/>
+                </a:solidFill>
+                <a:latin typeface="Tenorite (Body)"/>
+                <a:cs typeface="Arial" panose="020B0604020202020204" pitchFamily="34" charset="0"/>
+              </a:rPr>
+              <a:t>sceglie</a:t>
+            </a:r>
+            <a:r>
+              <a:rPr lang="en-US" altLang="en-US" sz="2200" dirty="0">
+                <a:solidFill>
+                  <a:srgbClr val="141414"/>
+                </a:solidFill>
+                <a:latin typeface="Tenorite (Body)"/>
+                <a:cs typeface="Arial" panose="020B0604020202020204" pitchFamily="34" charset="0"/>
+              </a:rPr>
+              <a:t> come Input di </a:t>
+            </a:r>
+            <a:r>
+              <a:rPr lang="en-US" altLang="en-US" sz="2200" dirty="0" err="1">
+                <a:solidFill>
+                  <a:srgbClr val="141414"/>
+                </a:solidFill>
+                <a:latin typeface="Tenorite (Body)"/>
+                <a:cs typeface="Arial" panose="020B0604020202020204" pitchFamily="34" charset="0"/>
+              </a:rPr>
+              <a:t>riga</a:t>
+            </a:r>
+            <a:r>
+              <a:rPr lang="en-US" altLang="en-US" sz="2200" dirty="0">
+                <a:solidFill>
+                  <a:srgbClr val="141414"/>
+                </a:solidFill>
+                <a:latin typeface="Tenorite (Body)"/>
+                <a:cs typeface="Arial" panose="020B0604020202020204" pitchFamily="34" charset="0"/>
+              </a:rPr>
+              <a:t> la </a:t>
+            </a:r>
+            <a:r>
+              <a:rPr lang="en-US" altLang="en-US" sz="2200" dirty="0" err="1">
+                <a:solidFill>
+                  <a:srgbClr val="141414"/>
+                </a:solidFill>
+                <a:latin typeface="Tenorite (Body)"/>
+                <a:cs typeface="Arial" panose="020B0604020202020204" pitchFamily="34" charset="0"/>
+              </a:rPr>
+              <a:t>cella</a:t>
+            </a:r>
+            <a:r>
+              <a:rPr lang="en-US" altLang="en-US" sz="2200" dirty="0">
+                <a:solidFill>
+                  <a:srgbClr val="141414"/>
+                </a:solidFill>
+                <a:latin typeface="Tenorite (Body)"/>
+                <a:cs typeface="Arial" panose="020B0604020202020204" pitchFamily="34" charset="0"/>
+              </a:rPr>
+              <a:t> </a:t>
+            </a:r>
+            <a:r>
+              <a:rPr lang="en-US" altLang="en-US" sz="2200" dirty="0" err="1">
+                <a:solidFill>
+                  <a:srgbClr val="141414"/>
+                </a:solidFill>
+                <a:latin typeface="Tenorite (Body)"/>
+                <a:cs typeface="Arial" panose="020B0604020202020204" pitchFamily="34" charset="0"/>
+              </a:rPr>
+              <a:t>che</a:t>
+            </a:r>
+            <a:r>
+              <a:rPr lang="en-US" altLang="en-US" sz="2200" dirty="0">
+                <a:solidFill>
+                  <a:srgbClr val="141414"/>
+                </a:solidFill>
+                <a:latin typeface="Tenorite (Body)"/>
+                <a:cs typeface="Arial" panose="020B0604020202020204" pitchFamily="34" charset="0"/>
+              </a:rPr>
+              <a:t> </a:t>
+            </a:r>
+            <a:r>
+              <a:rPr lang="en-US" altLang="en-US" sz="2200" dirty="0" err="1">
+                <a:solidFill>
+                  <a:srgbClr val="141414"/>
+                </a:solidFill>
+                <a:latin typeface="Tenorite (Body)"/>
+                <a:cs typeface="Arial" panose="020B0604020202020204" pitchFamily="34" charset="0"/>
+              </a:rPr>
+              <a:t>contiene</a:t>
+            </a:r>
+            <a:r>
+              <a:rPr lang="en-US" altLang="en-US" sz="2200" dirty="0">
+                <a:solidFill>
+                  <a:srgbClr val="141414"/>
+                </a:solidFill>
+                <a:latin typeface="Tenorite (Body)"/>
+                <a:cs typeface="Arial" panose="020B0604020202020204" pitchFamily="34" charset="0"/>
+              </a:rPr>
+              <a:t> la </a:t>
+            </a:r>
+            <a:r>
+              <a:rPr lang="en-US" altLang="en-US" sz="2200" dirty="0" err="1">
+                <a:solidFill>
+                  <a:srgbClr val="141414"/>
+                </a:solidFill>
+                <a:latin typeface="Tenorite (Body)"/>
+                <a:cs typeface="Arial" panose="020B0604020202020204" pitchFamily="34" charset="0"/>
+              </a:rPr>
+              <a:t>Durata</a:t>
+            </a:r>
+            <a:r>
+              <a:rPr lang="en-US" altLang="en-US" sz="2200" dirty="0">
+                <a:solidFill>
+                  <a:srgbClr val="141414"/>
+                </a:solidFill>
+                <a:latin typeface="Tenorite (Body)"/>
+                <a:cs typeface="Arial" panose="020B0604020202020204" pitchFamily="34" charset="0"/>
+              </a:rPr>
+              <a:t> (</a:t>
+            </a:r>
+            <a:r>
+              <a:rPr lang="en-US" altLang="en-US" sz="2200" dirty="0" err="1">
+                <a:solidFill>
+                  <a:srgbClr val="141414"/>
+                </a:solidFill>
+                <a:latin typeface="Tenorite (Body)"/>
+                <a:cs typeface="Arial" panose="020B0604020202020204" pitchFamily="34" charset="0"/>
+              </a:rPr>
+              <a:t>mesi</a:t>
+            </a:r>
+            <a:r>
+              <a:rPr lang="en-US" altLang="en-US" sz="2200" dirty="0">
+                <a:solidFill>
+                  <a:srgbClr val="141414"/>
+                </a:solidFill>
+                <a:latin typeface="Tenorite (Body)"/>
+                <a:cs typeface="Arial" panose="020B0604020202020204" pitchFamily="34" charset="0"/>
+              </a:rPr>
+              <a:t>), e come input di Colonna, il </a:t>
+            </a:r>
+            <a:r>
+              <a:rPr lang="en-US" altLang="en-US" sz="2200" dirty="0" err="1">
+                <a:solidFill>
+                  <a:srgbClr val="141414"/>
+                </a:solidFill>
+                <a:latin typeface="Tenorite (Body)"/>
+                <a:cs typeface="Arial" panose="020B0604020202020204" pitchFamily="34" charset="0"/>
+              </a:rPr>
+              <a:t>valore</a:t>
+            </a:r>
+            <a:r>
+              <a:rPr lang="en-US" altLang="en-US" sz="2200" dirty="0">
+                <a:solidFill>
+                  <a:srgbClr val="141414"/>
+                </a:solidFill>
+                <a:latin typeface="Tenorite (Body)"/>
+                <a:cs typeface="Arial" panose="020B0604020202020204" pitchFamily="34" charset="0"/>
+              </a:rPr>
+              <a:t> del Tasso di Interesse</a:t>
             </a:r>
             <a:endParaRPr lang="en-US" altLang="en-US" sz="2200" b="1" dirty="0">
               <a:solidFill>
@@ -31494,25 +31954,6 @@
 </file>
 
 <file path=customXml/item1.xml><?xml version="1.0" encoding="utf-8"?>
-<p:properties xmlns:p="http://schemas.microsoft.com/office/2006/metadata/properties" xmlns:xsi="http://www.w3.org/2001/XMLSchema-instance" xmlns:pc="http://schemas.microsoft.com/office/infopath/2007/PartnerControls">
-  <documentManagement>
-    <_ip_UnifiedCompliancePolicyUIAction xmlns="http://schemas.microsoft.com/sharepoint/v3" xsi:nil="true"/>
-    <Image xmlns="71af3243-3dd4-4a8d-8c0d-dd76da1f02a5">
-      <Url xsi:nil="true"/>
-      <Description xsi:nil="true"/>
-    </Image>
-    <Status xmlns="71af3243-3dd4-4a8d-8c0d-dd76da1f02a5">Not started</Status>
-    <_ip_UnifiedCompliancePolicyProperties xmlns="http://schemas.microsoft.com/sharepoint/v3" xsi:nil="true"/>
-    <ImageTagsTaxHTField xmlns="71af3243-3dd4-4a8d-8c0d-dd76da1f02a5">
-      <Terms xmlns="http://schemas.microsoft.com/office/infopath/2007/PartnerControls"/>
-    </ImageTagsTaxHTField>
-    <TaxCatchAll xmlns="230e9df3-be65-4c73-a93b-d1236ebd677e"/>
-    <MediaServiceKeyPoints xmlns="71af3243-3dd4-4a8d-8c0d-dd76da1f02a5" xsi:nil="true"/>
-  </documentManagement>
-</p:properties>
-</file>
-
-<file path=customXml/item2.xml><?xml version="1.0" encoding="utf-8"?>
 <ct:contentTypeSchema xmlns:ct="http://schemas.microsoft.com/office/2006/metadata/contentType" xmlns:ma="http://schemas.microsoft.com/office/2006/metadata/properties/metaAttributes" ct:_="" ma:_="" ma:contentTypeName="Document" ma:contentTypeID="0x01010079F111ED35F8CC479449609E8A0923A6" ma:contentTypeVersion="21" ma:contentTypeDescription="Create a new document." ma:contentTypeScope="" ma:versionID="64dfb1555687e0874b4304b796b5b0c7">
   <xsd:schema xmlns:xsd="http://www.w3.org/2001/XMLSchema" xmlns:xs="http://www.w3.org/2001/XMLSchema" xmlns:p="http://schemas.microsoft.com/office/2006/metadata/properties" xmlns:ns1="http://schemas.microsoft.com/sharepoint/v3" xmlns:ns2="71af3243-3dd4-4a8d-8c0d-dd76da1f02a5" xmlns:ns3="16c05727-aa75-4e4a-9b5f-8a80a1165891" xmlns:ns4="230e9df3-be65-4c73-a93b-d1236ebd677e" targetNamespace="http://schemas.microsoft.com/office/2006/metadata/properties" ma:root="true" ma:fieldsID="e6e4c555b5e194d05b7203de9c4567b3" ns1:_="" ns2:_="" ns3:_="" ns4:_="">
     <xsd:import namespace="http://schemas.microsoft.com/sharepoint/v3"/>
@@ -31794,6 +32235,25 @@
 </ct:contentTypeSchema>
 </file>
 
+<file path=customXml/item2.xml><?xml version="1.0" encoding="utf-8"?>
+<p:properties xmlns:p="http://schemas.microsoft.com/office/2006/metadata/properties" xmlns:xsi="http://www.w3.org/2001/XMLSchema-instance" xmlns:pc="http://schemas.microsoft.com/office/infopath/2007/PartnerControls">
+  <documentManagement>
+    <_ip_UnifiedCompliancePolicyUIAction xmlns="http://schemas.microsoft.com/sharepoint/v3" xsi:nil="true"/>
+    <Image xmlns="71af3243-3dd4-4a8d-8c0d-dd76da1f02a5">
+      <Url xsi:nil="true"/>
+      <Description xsi:nil="true"/>
+    </Image>
+    <Status xmlns="71af3243-3dd4-4a8d-8c0d-dd76da1f02a5">Not started</Status>
+    <_ip_UnifiedCompliancePolicyProperties xmlns="http://schemas.microsoft.com/sharepoint/v3" xsi:nil="true"/>
+    <ImageTagsTaxHTField xmlns="71af3243-3dd4-4a8d-8c0d-dd76da1f02a5">
+      <Terms xmlns="http://schemas.microsoft.com/office/infopath/2007/PartnerControls"/>
+    </ImageTagsTaxHTField>
+    <TaxCatchAll xmlns="230e9df3-be65-4c73-a93b-d1236ebd677e"/>
+    <MediaServiceKeyPoints xmlns="71af3243-3dd4-4a8d-8c0d-dd76da1f02a5" xsi:nil="true"/>
+  </documentManagement>
+</p:properties>
+</file>
+
 <file path=customXml/item3.xml><?xml version="1.0" encoding="utf-8"?>
 <?mso-contentType ?>
 <FormTemplates xmlns="http://schemas.microsoft.com/sharepoint/v3/contenttype/forms">
@@ -31804,25 +32264,6 @@
 </file>
 
 <file path=customXml/itemProps1.xml><?xml version="1.0" encoding="utf-8"?>
-<ds:datastoreItem xmlns:ds="http://schemas.openxmlformats.org/officeDocument/2006/customXml" ds:itemID="{4D5BAB77-79E1-4739-AA51-10C9079186D6}">
-  <ds:schemaRefs>
-    <ds:schemaRef ds:uri="http://www.w3.org/XML/1998/namespace"/>
-    <ds:schemaRef ds:uri="http://purl.org/dc/elements/1.1/"/>
-    <ds:schemaRef ds:uri="http://purl.org/dc/dcmitype/"/>
-    <ds:schemaRef ds:uri="230e9df3-be65-4c73-a93b-d1236ebd677e"/>
-    <ds:schemaRef ds:uri="http://schemas.microsoft.com/office/2006/documentManagement/types"/>
-    <ds:schemaRef ds:uri="http://schemas.microsoft.com/sharepoint/v3"/>
-    <ds:schemaRef ds:uri="http://purl.org/dc/terms/"/>
-    <ds:schemaRef ds:uri="http://schemas.microsoft.com/office/infopath/2007/PartnerControls"/>
-    <ds:schemaRef ds:uri="16c05727-aa75-4e4a-9b5f-8a80a1165891"/>
-    <ds:schemaRef ds:uri="http://schemas.openxmlformats.org/package/2006/metadata/core-properties"/>
-    <ds:schemaRef ds:uri="71af3243-3dd4-4a8d-8c0d-dd76da1f02a5"/>
-    <ds:schemaRef ds:uri="http://schemas.microsoft.com/office/2006/metadata/properties"/>
-  </ds:schemaRefs>
-</ds:datastoreItem>
-</file>
-
-<file path=customXml/itemProps2.xml><?xml version="1.0" encoding="utf-8"?>
 <ds:datastoreItem xmlns:ds="http://schemas.openxmlformats.org/officeDocument/2006/customXml" ds:itemID="{4A615295-94F6-4CE2-A1B1-6B7E1DAA5AD6}">
   <ds:schemaRefs>
     <ds:schemaRef ds:uri="http://schemas.microsoft.com/office/2006/metadata/contentType"/>
@@ -31843,6 +32284,25 @@
 </ds:datastoreItem>
 </file>
 
+<file path=customXml/itemProps2.xml><?xml version="1.0" encoding="utf-8"?>
+<ds:datastoreItem xmlns:ds="http://schemas.openxmlformats.org/officeDocument/2006/customXml" ds:itemID="{4D5BAB77-79E1-4739-AA51-10C9079186D6}">
+  <ds:schemaRefs>
+    <ds:schemaRef ds:uri="http://www.w3.org/XML/1998/namespace"/>
+    <ds:schemaRef ds:uri="http://purl.org/dc/elements/1.1/"/>
+    <ds:schemaRef ds:uri="http://purl.org/dc/dcmitype/"/>
+    <ds:schemaRef ds:uri="230e9df3-be65-4c73-a93b-d1236ebd677e"/>
+    <ds:schemaRef ds:uri="http://schemas.microsoft.com/office/2006/documentManagement/types"/>
+    <ds:schemaRef ds:uri="http://schemas.microsoft.com/sharepoint/v3"/>
+    <ds:schemaRef ds:uri="http://purl.org/dc/terms/"/>
+    <ds:schemaRef ds:uri="http://schemas.microsoft.com/office/infopath/2007/PartnerControls"/>
+    <ds:schemaRef ds:uri="16c05727-aa75-4e4a-9b5f-8a80a1165891"/>
+    <ds:schemaRef ds:uri="http://schemas.openxmlformats.org/package/2006/metadata/core-properties"/>
+    <ds:schemaRef ds:uri="71af3243-3dd4-4a8d-8c0d-dd76da1f02a5"/>
+    <ds:schemaRef ds:uri="http://schemas.microsoft.com/office/2006/metadata/properties"/>
+  </ds:schemaRefs>
+</ds:datastoreItem>
+</file>
+
 <file path=customXml/itemProps3.xml><?xml version="1.0" encoding="utf-8"?>
 <ds:datastoreItem xmlns:ds="http://schemas.openxmlformats.org/officeDocument/2006/customXml" ds:itemID="{85334180-0405-413B-834A-44FA9E05ADB7}">
   <ds:schemaRefs>

</xml_diff>